<commit_message>
Initial commit of Architecture and Technologies presentation
</commit_message>
<xml_diff>
--- a/tech_notes/Nimbus-core application.pptx
+++ b/tech_notes/Nimbus-core application.pptx
@@ -123,6 +123,11 @@
       </a:defRPr>
     </a:lvl9pPr>
   </p:defaultTextStyle>
+  <p:extLst>
+    <p:ext uri="{EFAFB233-063F-42B5-8137-9DF3F51BA10A}">
+      <p15:sldGuideLst xmlns:p15="http://schemas.microsoft.com/office/powerpoint/2012/main"/>
+    </p:ext>
+  </p:extLst>
 </p:presentation>
 </file>
 
@@ -5427,7 +5432,12 @@
             <p:ph type="subTitle" idx="1"/>
           </p:nvPr>
         </p:nvSpPr>
-        <p:spPr/>
+        <p:spPr>
+          <a:xfrm>
+            <a:off x="304799" y="4368944"/>
+            <a:ext cx="6400800" cy="1947333"/>
+          </a:xfrm>
+        </p:spPr>
         <p:txBody>
           <a:bodyPr/>
           <a:lstStyle/>
@@ -5436,7 +5446,29 @@
               <a:rPr lang="en-US" dirty="0" smtClean="0"/>
               <a:t> </a:t>
             </a:r>
-            <a:endParaRPr lang="en-US" dirty="0"/>
+            <a:r>
+              <a:rPr lang="en-US" sz="2800" dirty="0" smtClean="0">
+                <a:solidFill>
+                  <a:schemeClr val="tx1"/>
+                </a:solidFill>
+              </a:rPr>
+              <a:t>By </a:t>
+            </a:r>
+          </a:p>
+          <a:p>
+            <a:r>
+              <a:rPr lang="en-US" sz="2800" dirty="0" smtClean="0">
+                <a:solidFill>
+                  <a:schemeClr val="tx1"/>
+                </a:solidFill>
+              </a:rPr>
+              <a:t>GOTTAM SATEESH</a:t>
+            </a:r>
+            <a:endParaRPr lang="en-US" sz="2800" dirty="0">
+              <a:solidFill>
+                <a:schemeClr val="tx1"/>
+              </a:solidFill>
+            </a:endParaRPr>
           </a:p>
         </p:txBody>
       </p:sp>
@@ -7985,96 +8017,89 @@
       </p:grpSpPr>
       <p:sp>
         <p:nvSpPr>
-          <p:cNvPr id="2" name="Title 1"/>
-          <p:cNvSpPr>
-            <a:spLocks noGrp="1"/>
-          </p:cNvSpPr>
-          <p:nvPr>
-            <p:ph type="title"/>
+          <p:cNvPr id="3" name="Content Placeholder 2"/>
+          <p:cNvSpPr>
+            <a:spLocks noGrp="1"/>
+          </p:cNvSpPr>
+          <p:nvPr>
+            <p:ph idx="1"/>
           </p:nvPr>
         </p:nvSpPr>
         <p:spPr>
           <a:xfrm>
-            <a:off x="304800" y="1461607"/>
-            <a:ext cx="11540837" cy="692680"/>
+            <a:off x="568035" y="2247034"/>
+            <a:ext cx="9795165" cy="3615267"/>
           </a:xfrm>
         </p:spPr>
         <p:txBody>
           <a:bodyPr/>
           <a:lstStyle/>
           <a:p>
-            <a:pPr algn="ctr"/>
+            <a:pPr marL="0" indent="0" algn="ctr">
+              <a:buNone/>
+            </a:pPr>
+            <a:r>
+              <a:rPr lang="en-US" dirty="0">
+                <a:solidFill>
+                  <a:schemeClr val="tx1"/>
+                </a:solidFill>
+              </a:rPr>
+              <a:t>	</a:t>
+            </a:r>
             <a:r>
               <a:rPr lang="en-US" dirty="0" smtClean="0">
                 <a:solidFill>
-                  <a:schemeClr val="accent5">
-                    <a:lumMod val="75000"/>
-                  </a:schemeClr>
-                </a:solidFill>
-              </a:rPr>
-              <a:t>Any queries?</a:t>
-            </a:r>
-            <a:endParaRPr lang="en-US" dirty="0">
+                  <a:schemeClr val="tx1"/>
+                </a:solidFill>
+              </a:rPr>
+              <a:t>THANK YOU.</a:t>
+            </a:r>
+          </a:p>
+          <a:p>
+            <a:pPr marL="0" indent="0" algn="r">
+              <a:buNone/>
+            </a:pPr>
+            <a:r>
+              <a:rPr lang="en-US" dirty="0" err="1" smtClean="0">
+                <a:solidFill>
+                  <a:schemeClr val="tx1"/>
+                </a:solidFill>
+              </a:rPr>
+              <a:t>Gottam</a:t>
+            </a:r>
+            <a:r>
+              <a:rPr lang="en-US" dirty="0" smtClean="0">
+                <a:solidFill>
+                  <a:schemeClr val="tx1"/>
+                </a:solidFill>
+              </a:rPr>
+              <a:t> </a:t>
+            </a:r>
+            <a:r>
+              <a:rPr lang="en-US" dirty="0" smtClean="0">
+                <a:solidFill>
+                  <a:schemeClr val="tx1"/>
+                </a:solidFill>
+              </a:rPr>
+              <a:t>Sateesh</a:t>
+            </a:r>
+            <a:endParaRPr lang="en-US" dirty="0" smtClean="0">
               <a:solidFill>
-                <a:schemeClr val="accent5">
-                  <a:lumMod val="75000"/>
-                </a:schemeClr>
+                <a:schemeClr val="tx1"/>
               </a:solidFill>
             </a:endParaRPr>
           </a:p>
-        </p:txBody>
-      </p:sp>
-      <p:sp>
-        <p:nvSpPr>
-          <p:cNvPr id="3" name="Content Placeholder 2"/>
-          <p:cNvSpPr>
-            <a:spLocks noGrp="1"/>
-          </p:cNvSpPr>
-          <p:nvPr>
-            <p:ph idx="1"/>
-          </p:nvPr>
-        </p:nvSpPr>
-        <p:spPr>
-          <a:xfrm>
-            <a:off x="789708" y="2551834"/>
-            <a:ext cx="9531927" cy="3615267"/>
-          </a:xfrm>
-        </p:spPr>
-        <p:txBody>
-          <a:bodyPr/>
-          <a:lstStyle/>
-          <a:p>
-            <a:pPr marL="0" indent="0" algn="ctr">
+          <a:p>
+            <a:pPr marL="0" indent="0" algn="r">
               <a:buNone/>
             </a:pPr>
             <a:r>
-              <a:rPr lang="en-US" dirty="0">
-                <a:solidFill>
-                  <a:schemeClr val="tx1"/>
-                </a:solidFill>
-              </a:rPr>
-              <a:t>	</a:t>
-            </a:r>
-            <a:r>
               <a:rPr lang="en-US" dirty="0" smtClean="0">
                 <a:solidFill>
                   <a:schemeClr val="tx1"/>
                 </a:solidFill>
               </a:rPr>
-              <a:t>THANK YOU.</a:t>
-            </a:r>
-          </a:p>
-          <a:p>
-            <a:pPr marL="0" indent="0" algn="r">
-              <a:buNone/>
-            </a:pPr>
-            <a:r>
-              <a:rPr lang="en-US" dirty="0" err="1" smtClean="0">
-                <a:solidFill>
-                  <a:schemeClr val="tx1"/>
-                </a:solidFill>
-              </a:rPr>
-              <a:t>Gottam</a:t>
+              <a:t>+</a:t>
             </a:r>
             <a:r>
               <a:rPr lang="en-US" dirty="0" smtClean="0">
@@ -8082,21 +8107,13 @@
                   <a:schemeClr val="tx1"/>
                 </a:solidFill>
               </a:rPr>
-              <a:t> Sateesh,</a:t>
-            </a:r>
-          </a:p>
-          <a:p>
-            <a:pPr marL="0" indent="0" algn="r">
-              <a:buNone/>
-            </a:pPr>
-            <a:r>
-              <a:rPr lang="en-US" dirty="0" smtClean="0">
-                <a:solidFill>
-                  <a:schemeClr val="tx1"/>
-                </a:solidFill>
-              </a:rPr>
-              <a:t>+91-9347387973,</a:t>
-            </a:r>
+              <a:t>91-9347387973</a:t>
+            </a:r>
+            <a:endParaRPr lang="en-US" dirty="0" smtClean="0">
+              <a:solidFill>
+                <a:schemeClr val="tx1"/>
+              </a:solidFill>
+            </a:endParaRPr>
           </a:p>
           <a:p>
             <a:pPr marL="0" indent="0" algn="r">
@@ -8159,6 +8176,67 @@
           </a:extLst>
         </p:spPr>
       </p:pic>
+      <p:sp>
+        <p:nvSpPr>
+          <p:cNvPr id="7" name="TextBox 6"/>
+          <p:cNvSpPr txBox="1"/>
+          <p:nvPr/>
+        </p:nvSpPr>
+        <p:spPr>
+          <a:xfrm>
+            <a:off x="304800" y="1938263"/>
+            <a:ext cx="11222182" cy="830997"/>
+          </a:xfrm>
+          <a:prstGeom prst="rect">
+            <a:avLst/>
+          </a:prstGeom>
+          <a:noFill/>
+        </p:spPr>
+        <p:txBody>
+          <a:bodyPr wrap="square" rtlCol="0">
+            <a:spAutoFit/>
+          </a:bodyPr>
+          <a:lstStyle/>
+          <a:p>
+            <a:r>
+              <a:rPr lang="en-IN" sz="2400" dirty="0" smtClean="0"/>
+              <a:t>For </a:t>
+            </a:r>
+            <a:r>
+              <a:rPr lang="en-IN" sz="2400" dirty="0"/>
+              <a:t>any queries please feel free to contact me on the below mentioned email / </a:t>
+            </a:r>
+            <a:r>
+              <a:rPr lang="en-IN" sz="2400" dirty="0" smtClean="0"/>
+              <a:t>mobile. </a:t>
+            </a:r>
+            <a:endParaRPr lang="en-US" sz="2400" dirty="0"/>
+          </a:p>
+        </p:txBody>
+      </p:sp>
+      <p:sp>
+        <p:nvSpPr>
+          <p:cNvPr id="8" name="Title 7"/>
+          <p:cNvSpPr>
+            <a:spLocks noGrp="1"/>
+          </p:cNvSpPr>
+          <p:nvPr>
+            <p:ph type="title"/>
+          </p:nvPr>
+        </p:nvSpPr>
+        <p:spPr/>
+        <p:txBody>
+          <a:bodyPr/>
+          <a:lstStyle/>
+          <a:p>
+            <a:r>
+              <a:rPr lang="en-US" dirty="0" smtClean="0"/>
+              <a:t> </a:t>
+            </a:r>
+            <a:endParaRPr lang="en-US" dirty="0"/>
+          </a:p>
+        </p:txBody>
+      </p:sp>
     </p:spTree>
     <p:extLst>
       <p:ext uri="{BB962C8B-B14F-4D97-AF65-F5344CB8AC3E}">

</xml_diff>